<commit_message>
adding PowerPoint presentation for ML
</commit_message>
<xml_diff>
--- a/Snake game.pptx
+++ b/Snake game.pptx
@@ -229,7 +229,7 @@
           <a:p>
             <a:fld id="{4BE6205E-B305-4B90-9534-3C5E99A0275E}" type="datetimeFigureOut">
               <a:rPr lang="en-US" smtClean="0"/>
-              <a:t>10/30/2025</a:t>
+              <a:t>12/14/2025</a:t>
             </a:fld>
             <a:endParaRPr lang="en-US" dirty="0"/>
           </a:p>
@@ -406,7 +406,7 @@
           <a:p>
             <a:fld id="{233722F1-E430-42A1-A473-1759336AECCE}" type="datetimeFigureOut">
               <a:rPr lang="en-US" smtClean="0"/>
-              <a:t>10/30/2025</a:t>
+              <a:t>12/14/2025</a:t>
             </a:fld>
             <a:endParaRPr lang="en-US" dirty="0"/>
           </a:p>
@@ -10878,23 +10878,12 @@
 </file>
 
 <file path=customXml/item1.xml><?xml version="1.0" encoding="utf-8"?>
-<p:properties xmlns:p="http://schemas.microsoft.com/office/2006/metadata/properties" xmlns:xsi="http://www.w3.org/2001/XMLSchema-instance" xmlns:pc="http://schemas.microsoft.com/office/infopath/2007/PartnerControls">
-  <documentManagement>
-    <_ip_UnifiedCompliancePolicyUIAction xmlns="http://schemas.microsoft.com/sharepoint/v3" xsi:nil="true"/>
-    <Image xmlns="71af3243-3dd4-4a8d-8c0d-dd76da1f02a5">
-      <Url xsi:nil="true"/>
-      <Description xsi:nil="true"/>
-    </Image>
-    <Status xmlns="71af3243-3dd4-4a8d-8c0d-dd76da1f02a5">Not started</Status>
-    <Background xmlns="71af3243-3dd4-4a8d-8c0d-dd76da1f02a5">false</Background>
-    <_ip_UnifiedCompliancePolicyProperties xmlns="http://schemas.microsoft.com/sharepoint/v3" xsi:nil="true"/>
-    <ImageTagsTaxHTField xmlns="71af3243-3dd4-4a8d-8c0d-dd76da1f02a5">
-      <Terms xmlns="http://schemas.microsoft.com/office/infopath/2007/PartnerControls"/>
-    </ImageTagsTaxHTField>
-    <TaxCatchAll xmlns="230e9df3-be65-4c73-a93b-d1236ebd677e" xsi:nil="true"/>
-    <MediaServiceKeyPoints xmlns="71af3243-3dd4-4a8d-8c0d-dd76da1f02a5" xsi:nil="true"/>
-  </documentManagement>
-</p:properties>
+<?mso-contentType ?>
+<FormTemplates xmlns="http://schemas.microsoft.com/sharepoint/v3/contenttype/forms">
+  <Display>DocumentLibraryForm</Display>
+  <Edit>DocumentLibraryForm</Edit>
+  <New>DocumentLibraryForm</New>
+</FormTemplates>
 </file>
 
 <file path=customXml/item2.xml><?xml version="1.0" encoding="utf-8"?>
@@ -11210,22 +11199,29 @@
 </file>
 
 <file path=customXml/item3.xml><?xml version="1.0" encoding="utf-8"?>
-<?mso-contentType ?>
-<FormTemplates xmlns="http://schemas.microsoft.com/sharepoint/v3/contenttype/forms">
-  <Display>DocumentLibraryForm</Display>
-  <Edit>DocumentLibraryForm</Edit>
-  <New>DocumentLibraryForm</New>
-</FormTemplates>
+<p:properties xmlns:p="http://schemas.microsoft.com/office/2006/metadata/properties" xmlns:xsi="http://www.w3.org/2001/XMLSchema-instance" xmlns:pc="http://schemas.microsoft.com/office/infopath/2007/PartnerControls">
+  <documentManagement>
+    <_ip_UnifiedCompliancePolicyUIAction xmlns="http://schemas.microsoft.com/sharepoint/v3" xsi:nil="true"/>
+    <Image xmlns="71af3243-3dd4-4a8d-8c0d-dd76da1f02a5">
+      <Url xsi:nil="true"/>
+      <Description xsi:nil="true"/>
+    </Image>
+    <Status xmlns="71af3243-3dd4-4a8d-8c0d-dd76da1f02a5">Not started</Status>
+    <Background xmlns="71af3243-3dd4-4a8d-8c0d-dd76da1f02a5">false</Background>
+    <_ip_UnifiedCompliancePolicyProperties xmlns="http://schemas.microsoft.com/sharepoint/v3" xsi:nil="true"/>
+    <ImageTagsTaxHTField xmlns="71af3243-3dd4-4a8d-8c0d-dd76da1f02a5">
+      <Terms xmlns="http://schemas.microsoft.com/office/infopath/2007/PartnerControls"/>
+    </ImageTagsTaxHTField>
+    <TaxCatchAll xmlns="230e9df3-be65-4c73-a93b-d1236ebd677e" xsi:nil="true"/>
+    <MediaServiceKeyPoints xmlns="71af3243-3dd4-4a8d-8c0d-dd76da1f02a5" xsi:nil="true"/>
+  </documentManagement>
+</p:properties>
 </file>
 
 <file path=customXml/itemProps1.xml><?xml version="1.0" encoding="utf-8"?>
-<ds:datastoreItem xmlns:ds="http://schemas.openxmlformats.org/officeDocument/2006/customXml" ds:itemID="{3FDB7358-0BCB-4DEB-B717-C1D7CC555F05}">
+<ds:datastoreItem xmlns:ds="http://schemas.openxmlformats.org/officeDocument/2006/customXml" ds:itemID="{6DE3707C-8CAB-4302-B7E1-D32E1543E05C}">
   <ds:schemaRefs>
-    <ds:schemaRef ds:uri="http://schemas.microsoft.com/office/2006/metadata/properties"/>
-    <ds:schemaRef ds:uri="http://schemas.microsoft.com/office/infopath/2007/PartnerControls"/>
-    <ds:schemaRef ds:uri="http://schemas.microsoft.com/sharepoint/v3"/>
-    <ds:schemaRef ds:uri="71af3243-3dd4-4a8d-8c0d-dd76da1f02a5"/>
-    <ds:schemaRef ds:uri="230e9df3-be65-4c73-a93b-d1236ebd677e"/>
+    <ds:schemaRef ds:uri="http://schemas.microsoft.com/sharepoint/v3/contenttype/forms"/>
   </ds:schemaRefs>
 </ds:datastoreItem>
 </file>
@@ -11252,9 +11248,13 @@
 </file>
 
 <file path=customXml/itemProps3.xml><?xml version="1.0" encoding="utf-8"?>
-<ds:datastoreItem xmlns:ds="http://schemas.openxmlformats.org/officeDocument/2006/customXml" ds:itemID="{6DE3707C-8CAB-4302-B7E1-D32E1543E05C}">
+<ds:datastoreItem xmlns:ds="http://schemas.openxmlformats.org/officeDocument/2006/customXml" ds:itemID="{3FDB7358-0BCB-4DEB-B717-C1D7CC555F05}">
   <ds:schemaRefs>
-    <ds:schemaRef ds:uri="http://schemas.microsoft.com/sharepoint/v3/contenttype/forms"/>
+    <ds:schemaRef ds:uri="http://schemas.microsoft.com/office/2006/metadata/properties"/>
+    <ds:schemaRef ds:uri="http://schemas.microsoft.com/office/infopath/2007/PartnerControls"/>
+    <ds:schemaRef ds:uri="http://schemas.microsoft.com/sharepoint/v3"/>
+    <ds:schemaRef ds:uri="71af3243-3dd4-4a8d-8c0d-dd76da1f02a5"/>
+    <ds:schemaRef ds:uri="230e9df3-be65-4c73-a93b-d1236ebd677e"/>
   </ds:schemaRefs>
 </ds:datastoreItem>
 </file>

</xml_diff>